<commit_message>
Added randomly picked programming assignment
</commit_message>
<xml_diff>
--- a/Class 2 - Development Environment & Version Control.pptx
+++ b/Class 2 - Development Environment & Version Control.pptx
@@ -5,23 +5,24 @@
     <p:sldMasterId id="2147483648" r:id="rId1"/>
   </p:sldMasterIdLst>
   <p:notesMasterIdLst>
-    <p:notesMasterId r:id="rId16"/>
+    <p:notesMasterId r:id="rId17"/>
   </p:notesMasterIdLst>
   <p:sldIdLst>
     <p:sldId id="256" r:id="rId2"/>
-    <p:sldId id="257" r:id="rId3"/>
-    <p:sldId id="258" r:id="rId4"/>
-    <p:sldId id="259" r:id="rId5"/>
-    <p:sldId id="260" r:id="rId6"/>
-    <p:sldId id="261" r:id="rId7"/>
-    <p:sldId id="262" r:id="rId8"/>
-    <p:sldId id="263" r:id="rId9"/>
-    <p:sldId id="264" r:id="rId10"/>
-    <p:sldId id="265" r:id="rId11"/>
-    <p:sldId id="266" r:id="rId12"/>
-    <p:sldId id="267" r:id="rId13"/>
-    <p:sldId id="268" r:id="rId14"/>
-    <p:sldId id="269" r:id="rId15"/>
+    <p:sldId id="270" r:id="rId3"/>
+    <p:sldId id="257" r:id="rId4"/>
+    <p:sldId id="258" r:id="rId5"/>
+    <p:sldId id="259" r:id="rId6"/>
+    <p:sldId id="260" r:id="rId7"/>
+    <p:sldId id="261" r:id="rId8"/>
+    <p:sldId id="262" r:id="rId9"/>
+    <p:sldId id="263" r:id="rId10"/>
+    <p:sldId id="264" r:id="rId11"/>
+    <p:sldId id="265" r:id="rId12"/>
+    <p:sldId id="266" r:id="rId13"/>
+    <p:sldId id="267" r:id="rId14"/>
+    <p:sldId id="268" r:id="rId15"/>
+    <p:sldId id="269" r:id="rId16"/>
   </p:sldIdLst>
   <p:sldSz cx="9144000" cy="6858000" type="screen4x3"/>
   <p:notesSz cx="6858000" cy="9144000"/>
@@ -205,7 +206,7 @@
           <a:p>
             <a:fld id="{6420A69C-8FAB-ED43-A6DC-0C4F7CFDBE5F}" type="datetimeFigureOut">
               <a:rPr lang="en-US" smtClean="0"/>
-              <a:t>1/30/16</a:t>
+              <a:t>2/1/16</a:t>
             </a:fld>
             <a:endParaRPr lang="en-US"/>
           </a:p>
@@ -946,7 +947,7 @@
           <a:p>
             <a:fld id="{C91649B5-1C6E-4B49-B92F-FFA47CDA0DE4}" type="slidenum">
               <a:rPr lang="en-US" smtClean="0"/>
-              <a:t>3</a:t>
+              <a:t>4</a:t>
             </a:fld>
             <a:endParaRPr lang="en-US"/>
           </a:p>
@@ -1039,7 +1040,7 @@
           <a:p>
             <a:fld id="{C91649B5-1C6E-4B49-B92F-FFA47CDA0DE4}" type="slidenum">
               <a:rPr lang="en-US" smtClean="0"/>
-              <a:t>12</a:t>
+              <a:t>13</a:t>
             </a:fld>
             <a:endParaRPr lang="en-US"/>
           </a:p>
@@ -1132,7 +1133,7 @@
           <a:p>
             <a:fld id="{C91649B5-1C6E-4B49-B92F-FFA47CDA0DE4}" type="slidenum">
               <a:rPr lang="en-US" smtClean="0"/>
-              <a:t>13</a:t>
+              <a:t>14</a:t>
             </a:fld>
             <a:endParaRPr lang="en-US"/>
           </a:p>
@@ -1225,7 +1226,7 @@
           <a:p>
             <a:fld id="{C91649B5-1C6E-4B49-B92F-FFA47CDA0DE4}" type="slidenum">
               <a:rPr lang="en-US" smtClean="0"/>
-              <a:t>14</a:t>
+              <a:t>15</a:t>
             </a:fld>
             <a:endParaRPr lang="en-US"/>
           </a:p>
@@ -1558,7 +1559,7 @@
           <a:p>
             <a:fld id="{C91649B5-1C6E-4B49-B92F-FFA47CDA0DE4}" type="slidenum">
               <a:rPr lang="en-US" smtClean="0"/>
-              <a:t>4</a:t>
+              <a:t>5</a:t>
             </a:fld>
             <a:endParaRPr lang="en-US"/>
           </a:p>
@@ -1671,7 +1672,7 @@
           <a:p>
             <a:fld id="{C91649B5-1C6E-4B49-B92F-FFA47CDA0DE4}" type="slidenum">
               <a:rPr lang="en-US" smtClean="0"/>
-              <a:t>5</a:t>
+              <a:t>6</a:t>
             </a:fld>
             <a:endParaRPr lang="en-US"/>
           </a:p>
@@ -1764,7 +1765,7 @@
           <a:p>
             <a:fld id="{C91649B5-1C6E-4B49-B92F-FFA47CDA0DE4}" type="slidenum">
               <a:rPr lang="en-US" smtClean="0"/>
-              <a:t>6</a:t>
+              <a:t>7</a:t>
             </a:fld>
             <a:endParaRPr lang="en-US"/>
           </a:p>
@@ -2032,7 +2033,7 @@
           <a:p>
             <a:fld id="{C91649B5-1C6E-4B49-B92F-FFA47CDA0DE4}" type="slidenum">
               <a:rPr lang="en-US" smtClean="0"/>
-              <a:t>7</a:t>
+              <a:t>8</a:t>
             </a:fld>
             <a:endParaRPr lang="en-US"/>
           </a:p>
@@ -2125,7 +2126,7 @@
           <a:p>
             <a:fld id="{C91649B5-1C6E-4B49-B92F-FFA47CDA0DE4}" type="slidenum">
               <a:rPr lang="en-US" smtClean="0"/>
-              <a:t>8</a:t>
+              <a:t>9</a:t>
             </a:fld>
             <a:endParaRPr lang="en-US"/>
           </a:p>
@@ -2218,7 +2219,7 @@
           <a:p>
             <a:fld id="{C91649B5-1C6E-4B49-B92F-FFA47CDA0DE4}" type="slidenum">
               <a:rPr lang="en-US" smtClean="0"/>
-              <a:t>9</a:t>
+              <a:t>10</a:t>
             </a:fld>
             <a:endParaRPr lang="en-US"/>
           </a:p>
@@ -2311,7 +2312,7 @@
           <a:p>
             <a:fld id="{C91649B5-1C6E-4B49-B92F-FFA47CDA0DE4}" type="slidenum">
               <a:rPr lang="en-US" smtClean="0"/>
-              <a:t>10</a:t>
+              <a:t>11</a:t>
             </a:fld>
             <a:endParaRPr lang="en-US"/>
           </a:p>
@@ -2404,7 +2405,7 @@
           <a:p>
             <a:fld id="{C91649B5-1C6E-4B49-B92F-FFA47CDA0DE4}" type="slidenum">
               <a:rPr lang="en-US" smtClean="0"/>
-              <a:t>11</a:t>
+              <a:t>12</a:t>
             </a:fld>
             <a:endParaRPr lang="en-US"/>
           </a:p>
@@ -2604,7 +2605,7 @@
           <a:p>
             <a:fld id="{6BFECD78-3C8E-49F2-8FAB-59489D168ABB}" type="datetimeFigureOut">
               <a:rPr lang="en-US" smtClean="0"/>
-              <a:t>1/30/16</a:t>
+              <a:t>2/1/16</a:t>
             </a:fld>
             <a:endParaRPr lang="en-US"/>
           </a:p>
@@ -2774,7 +2775,7 @@
           <a:p>
             <a:fld id="{6BFECD78-3C8E-49F2-8FAB-59489D168ABB}" type="datetimeFigureOut">
               <a:rPr lang="en-US" smtClean="0"/>
-              <a:t>1/30/16</a:t>
+              <a:t>2/1/16</a:t>
             </a:fld>
             <a:endParaRPr lang="en-US"/>
           </a:p>
@@ -2954,7 +2955,7 @@
           <a:p>
             <a:fld id="{6BFECD78-3C8E-49F2-8FAB-59489D168ABB}" type="datetimeFigureOut">
               <a:rPr lang="en-US" smtClean="0"/>
-              <a:t>1/30/16</a:t>
+              <a:t>2/1/16</a:t>
             </a:fld>
             <a:endParaRPr lang="en-US"/>
           </a:p>
@@ -3124,7 +3125,7 @@
           <a:p>
             <a:fld id="{6BFECD78-3C8E-49F2-8FAB-59489D168ABB}" type="datetimeFigureOut">
               <a:rPr lang="en-US" smtClean="0"/>
-              <a:t>1/30/16</a:t>
+              <a:t>2/1/16</a:t>
             </a:fld>
             <a:endParaRPr lang="en-US"/>
           </a:p>
@@ -3370,7 +3371,7 @@
           <a:p>
             <a:fld id="{6BFECD78-3C8E-49F2-8FAB-59489D168ABB}" type="datetimeFigureOut">
               <a:rPr lang="en-US" smtClean="0"/>
-              <a:t>1/30/16</a:t>
+              <a:t>2/1/16</a:t>
             </a:fld>
             <a:endParaRPr lang="en-US"/>
           </a:p>
@@ -3658,7 +3659,7 @@
           <a:p>
             <a:fld id="{6BFECD78-3C8E-49F2-8FAB-59489D168ABB}" type="datetimeFigureOut">
               <a:rPr lang="en-US" smtClean="0"/>
-              <a:t>1/30/16</a:t>
+              <a:t>2/1/16</a:t>
             </a:fld>
             <a:endParaRPr lang="en-US"/>
           </a:p>
@@ -4080,7 +4081,7 @@
           <a:p>
             <a:fld id="{6BFECD78-3C8E-49F2-8FAB-59489D168ABB}" type="datetimeFigureOut">
               <a:rPr lang="en-US" smtClean="0"/>
-              <a:t>1/30/16</a:t>
+              <a:t>2/1/16</a:t>
             </a:fld>
             <a:endParaRPr lang="en-US"/>
           </a:p>
@@ -4198,7 +4199,7 @@
           <a:p>
             <a:fld id="{6BFECD78-3C8E-49F2-8FAB-59489D168ABB}" type="datetimeFigureOut">
               <a:rPr lang="en-US" smtClean="0"/>
-              <a:t>1/30/16</a:t>
+              <a:t>2/1/16</a:t>
             </a:fld>
             <a:endParaRPr lang="en-US"/>
           </a:p>
@@ -4293,7 +4294,7 @@
           <a:p>
             <a:fld id="{6BFECD78-3C8E-49F2-8FAB-59489D168ABB}" type="datetimeFigureOut">
               <a:rPr lang="en-US" smtClean="0"/>
-              <a:t>1/30/16</a:t>
+              <a:t>2/1/16</a:t>
             </a:fld>
             <a:endParaRPr lang="en-US"/>
           </a:p>
@@ -4570,7 +4571,7 @@
           <a:p>
             <a:fld id="{6BFECD78-3C8E-49F2-8FAB-59489D168ABB}" type="datetimeFigureOut">
               <a:rPr lang="en-US" smtClean="0"/>
-              <a:t>1/30/16</a:t>
+              <a:t>2/1/16</a:t>
             </a:fld>
             <a:endParaRPr lang="en-US"/>
           </a:p>
@@ -4827,7 +4828,7 @@
           <a:p>
             <a:fld id="{6BFECD78-3C8E-49F2-8FAB-59489D168ABB}" type="datetimeFigureOut">
               <a:rPr lang="en-US" smtClean="0"/>
-              <a:t>1/30/16</a:t>
+              <a:t>2/1/16</a:t>
             </a:fld>
             <a:endParaRPr lang="en-US"/>
           </a:p>
@@ -5047,7 +5048,7 @@
           <a:p>
             <a:fld id="{6BFECD78-3C8E-49F2-8FAB-59489D168ABB}" type="datetimeFigureOut">
               <a:rPr lang="en-US" smtClean="0"/>
-              <a:t>1/30/16</a:t>
+              <a:t>2/1/16</a:t>
             </a:fld>
             <a:endParaRPr lang="en-US"/>
           </a:p>
@@ -5885,10 +5886,6 @@
                 </a:rPr>
                 <a:t>CS-Y 6015 Software Engineering for Web Applications</a:t>
               </a:r>
-              <a:endParaRPr lang="en-US" sz="800" dirty="0">
-                <a:latin typeface="Helvetica Neue"/>
-                <a:cs typeface="Helvetica Neue"/>
-              </a:endParaRPr>
             </a:p>
           </p:txBody>
         </p:sp>
@@ -6453,7 +6450,7 @@
         <p:spPr>
           <a:xfrm>
             <a:off x="1122632" y="4667074"/>
-            <a:ext cx="6894972" cy="1015663"/>
+            <a:ext cx="6894972" cy="1200329"/>
           </a:xfrm>
           <a:prstGeom prst="rect">
             <a:avLst/>
@@ -6465,13 +6462,55 @@
           </a:bodyPr>
           <a:lstStyle/>
           <a:p>
-            <a:pPr algn="ctr"/>
-            <a:r>
-              <a:rPr lang="en-US" sz="6000" b="1" dirty="0" smtClean="0">
+            <a:pPr marL="457200" indent="-457200">
+              <a:buFont typeface="Arial"/>
+              <a:buChar char="•"/>
+            </a:pPr>
+            <a:r>
+              <a:rPr lang="en-US" b="1" dirty="0" smtClean="0">
                 <a:latin typeface="Helvetica Neue"/>
                 <a:cs typeface="Helvetica Neue"/>
               </a:rPr>
-              <a:t>Other ideas?</a:t>
+              <a:t>Social Network</a:t>
+            </a:r>
+          </a:p>
+          <a:p>
+            <a:pPr marL="457200" indent="-457200">
+              <a:buFont typeface="Arial"/>
+              <a:buChar char="•"/>
+            </a:pPr>
+            <a:r>
+              <a:rPr lang="en-US" b="1" dirty="0" smtClean="0">
+                <a:latin typeface="Helvetica Neue"/>
+                <a:cs typeface="Helvetica Neue"/>
+              </a:rPr>
+              <a:t>Blog</a:t>
+            </a:r>
+          </a:p>
+          <a:p>
+            <a:pPr marL="457200" indent="-457200">
+              <a:buFont typeface="Arial"/>
+              <a:buChar char="•"/>
+            </a:pPr>
+            <a:r>
+              <a:rPr lang="en-US" b="1" dirty="0" smtClean="0">
+                <a:latin typeface="Helvetica Neue"/>
+                <a:cs typeface="Helvetica Neue"/>
+              </a:rPr>
+              <a:t>Store</a:t>
+            </a:r>
+          </a:p>
+          <a:p>
+            <a:pPr marL="457200" indent="-457200">
+              <a:buFont typeface="Arial"/>
+              <a:buChar char="•"/>
+            </a:pPr>
+            <a:r>
+              <a:rPr lang="en-US" b="1" dirty="0" smtClean="0">
+                <a:latin typeface="Helvetica Neue"/>
+                <a:cs typeface="Helvetica Neue"/>
+              </a:rPr>
+              <a:t>Dashboard</a:t>
             </a:r>
           </a:p>
         </p:txBody>
@@ -6515,7 +6554,7 @@
     </p:spTree>
     <p:extLst>
       <p:ext uri="{BB962C8B-B14F-4D97-AF65-F5344CB8AC3E}">
-        <p14:creationId xmlns:p14="http://schemas.microsoft.com/office/powerpoint/2010/main" val="2917111392"/>
+        <p14:creationId xmlns:p14="http://schemas.microsoft.com/office/powerpoint/2010/main" val="3831705916"/>
       </p:ext>
     </p:extLst>
   </p:cSld>
@@ -6891,6 +6930,38 @@
       </p:sp>
       <p:sp>
         <p:nvSpPr>
+          <p:cNvPr id="3" name="Rectangle 2"/>
+          <p:cNvSpPr/>
+          <p:nvPr/>
+        </p:nvSpPr>
+        <p:spPr>
+          <a:xfrm>
+            <a:off x="1122632" y="4667074"/>
+            <a:ext cx="6894972" cy="1015663"/>
+          </a:xfrm>
+          <a:prstGeom prst="rect">
+            <a:avLst/>
+          </a:prstGeom>
+        </p:spPr>
+        <p:txBody>
+          <a:bodyPr wrap="square">
+            <a:spAutoFit/>
+          </a:bodyPr>
+          <a:lstStyle/>
+          <a:p>
+            <a:pPr algn="ctr"/>
+            <a:r>
+              <a:rPr lang="en-US" sz="6000" b="1" dirty="0" smtClean="0">
+                <a:latin typeface="Helvetica Neue"/>
+                <a:cs typeface="Helvetica Neue"/>
+              </a:rPr>
+              <a:t>Other ideas?</a:t>
+            </a:r>
+          </a:p>
+        </p:txBody>
+      </p:sp>
+      <p:sp>
+        <p:nvSpPr>
           <p:cNvPr id="9" name="Rectangle 8"/>
           <p:cNvSpPr/>
           <p:nvPr/>
@@ -6912,12 +6983,11 @@
           <a:p>
             <a:pPr algn="ctr"/>
             <a:r>
-              <a:rPr lang="en-US" b="1" dirty="0"/>
-              <a:t>Pre-development Process</a:t>
-            </a:r>
-            <a:r>
-              <a:rPr lang="en-US" dirty="0"/>
-              <a:t> </a:t>
+              <a:rPr lang="en-US" b="1" dirty="0" smtClean="0">
+                <a:latin typeface="Helvetica Neue"/>
+                <a:cs typeface="Helvetica Neue"/>
+              </a:rPr>
+              <a:t>Ideas</a:t>
             </a:r>
             <a:endParaRPr lang="en-US" b="1" dirty="0">
               <a:latin typeface="Helvetica Neue"/>
@@ -6926,146 +6996,10 @@
           </a:p>
         </p:txBody>
       </p:sp>
-      <p:sp>
-        <p:nvSpPr>
-          <p:cNvPr id="10" name="Rectangle 9"/>
-          <p:cNvSpPr/>
-          <p:nvPr/>
-        </p:nvSpPr>
-        <p:spPr>
-          <a:xfrm>
-            <a:off x="422276" y="3945315"/>
-            <a:ext cx="8666831" cy="707886"/>
-          </a:xfrm>
-          <a:prstGeom prst="rect">
-            <a:avLst/>
-          </a:prstGeom>
-        </p:spPr>
-        <p:txBody>
-          <a:bodyPr wrap="square">
-            <a:spAutoFit/>
-          </a:bodyPr>
-          <a:lstStyle/>
-          <a:p>
-            <a:pPr algn="ctr"/>
-            <a:r>
-              <a:rPr lang="en-US" sz="4000" b="1" dirty="0" smtClean="0">
-                <a:latin typeface="Helvetica Neue"/>
-                <a:cs typeface="Helvetica Neue"/>
-              </a:rPr>
-              <a:t>Web Application requirements</a:t>
-            </a:r>
-            <a:endParaRPr lang="en-US" sz="4000" b="1" dirty="0">
-              <a:latin typeface="Helvetica Neue"/>
-              <a:cs typeface="Helvetica Neue"/>
-            </a:endParaRPr>
-          </a:p>
-        </p:txBody>
-      </p:sp>
-      <p:sp>
-        <p:nvSpPr>
-          <p:cNvPr id="13" name="Rectangle 12"/>
-          <p:cNvSpPr/>
-          <p:nvPr/>
-        </p:nvSpPr>
-        <p:spPr>
-          <a:xfrm>
-            <a:off x="1122632" y="4782533"/>
-            <a:ext cx="6894972" cy="1754327"/>
-          </a:xfrm>
-          <a:prstGeom prst="rect">
-            <a:avLst/>
-          </a:prstGeom>
-        </p:spPr>
-        <p:txBody>
-          <a:bodyPr wrap="square">
-            <a:spAutoFit/>
-          </a:bodyPr>
-          <a:lstStyle/>
-          <a:p>
-            <a:pPr marL="457200" indent="-457200">
-              <a:buFont typeface="Arial"/>
-              <a:buChar char="•"/>
-            </a:pPr>
-            <a:r>
-              <a:rPr lang="en-US" b="1" dirty="0" smtClean="0">
-                <a:latin typeface="Helvetica Neue"/>
-                <a:cs typeface="Helvetica Neue"/>
-              </a:rPr>
-              <a:t>Purpose</a:t>
-            </a:r>
-          </a:p>
-          <a:p>
-            <a:pPr marL="457200" indent="-457200">
-              <a:buFont typeface="Arial"/>
-              <a:buChar char="•"/>
-            </a:pPr>
-            <a:r>
-              <a:rPr lang="en-US" b="1" dirty="0" smtClean="0">
-                <a:latin typeface="Helvetica Neue"/>
-                <a:cs typeface="Helvetica Neue"/>
-              </a:rPr>
-              <a:t>Goals for users</a:t>
-            </a:r>
-          </a:p>
-          <a:p>
-            <a:pPr marL="457200" indent="-457200">
-              <a:buFont typeface="Arial"/>
-              <a:buChar char="•"/>
-            </a:pPr>
-            <a:r>
-              <a:rPr lang="en-US" b="1" dirty="0" smtClean="0">
-                <a:latin typeface="Helvetica Neue"/>
-                <a:cs typeface="Helvetica Neue"/>
-              </a:rPr>
-              <a:t>Marketing</a:t>
-            </a:r>
-          </a:p>
-          <a:p>
-            <a:pPr marL="457200" indent="-457200">
-              <a:buFont typeface="Arial"/>
-              <a:buChar char="•"/>
-            </a:pPr>
-            <a:r>
-              <a:rPr lang="en-US" b="1" dirty="0" smtClean="0">
-                <a:latin typeface="Helvetica Neue"/>
-                <a:cs typeface="Helvetica Neue"/>
-              </a:rPr>
-              <a:t>Target Audience</a:t>
-            </a:r>
-          </a:p>
-          <a:p>
-            <a:pPr marL="457200" indent="-457200">
-              <a:buFont typeface="Arial"/>
-              <a:buChar char="•"/>
-            </a:pPr>
-            <a:r>
-              <a:rPr lang="en-US" b="1" dirty="0" smtClean="0">
-                <a:latin typeface="Helvetica Neue"/>
-                <a:cs typeface="Helvetica Neue"/>
-              </a:rPr>
-              <a:t>Competition / Examples</a:t>
-            </a:r>
-          </a:p>
-          <a:p>
-            <a:pPr marL="457200" indent="-457200">
-              <a:buFont typeface="Arial"/>
-              <a:buChar char="•"/>
-            </a:pPr>
-            <a:r>
-              <a:rPr lang="en-US" b="1" dirty="0" smtClean="0">
-                <a:latin typeface="Helvetica Neue"/>
-                <a:cs typeface="Helvetica Neue"/>
-              </a:rPr>
-              <a:t>Technical Requirements</a:t>
-            </a:r>
-          </a:p>
-        </p:txBody>
-      </p:sp>
     </p:spTree>
     <p:extLst>
       <p:ext uri="{BB962C8B-B14F-4D97-AF65-F5344CB8AC3E}">
-        <p14:creationId xmlns:p14="http://schemas.microsoft.com/office/powerpoint/2010/main" val="1876841298"/>
+        <p14:creationId xmlns:p14="http://schemas.microsoft.com/office/powerpoint/2010/main" val="2917111392"/>
       </p:ext>
     </p:extLst>
   </p:cSld>
@@ -7441,38 +7375,6 @@
       </p:sp>
       <p:sp>
         <p:nvSpPr>
-          <p:cNvPr id="3" name="Rectangle 2"/>
-          <p:cNvSpPr/>
-          <p:nvPr/>
-        </p:nvSpPr>
-        <p:spPr>
-          <a:xfrm>
-            <a:off x="1122632" y="4667074"/>
-            <a:ext cx="6894972" cy="1015663"/>
-          </a:xfrm>
-          <a:prstGeom prst="rect">
-            <a:avLst/>
-          </a:prstGeom>
-        </p:spPr>
-        <p:txBody>
-          <a:bodyPr wrap="square">
-            <a:spAutoFit/>
-          </a:bodyPr>
-          <a:lstStyle/>
-          <a:p>
-            <a:pPr algn="ctr"/>
-            <a:r>
-              <a:rPr lang="en-US" sz="6000" b="1" dirty="0" smtClean="0">
-                <a:latin typeface="Helvetica Neue"/>
-                <a:cs typeface="Helvetica Neue"/>
-              </a:rPr>
-              <a:t>Sitemap</a:t>
-            </a:r>
-          </a:p>
-        </p:txBody>
-      </p:sp>
-      <p:sp>
-        <p:nvSpPr>
           <p:cNvPr id="9" name="Rectangle 8"/>
           <p:cNvSpPr/>
           <p:nvPr/>
@@ -7508,10 +7410,146 @@
           </a:p>
         </p:txBody>
       </p:sp>
+      <p:sp>
+        <p:nvSpPr>
+          <p:cNvPr id="10" name="Rectangle 9"/>
+          <p:cNvSpPr/>
+          <p:nvPr/>
+        </p:nvSpPr>
+        <p:spPr>
+          <a:xfrm>
+            <a:off x="422276" y="3945315"/>
+            <a:ext cx="8666831" cy="707886"/>
+          </a:xfrm>
+          <a:prstGeom prst="rect">
+            <a:avLst/>
+          </a:prstGeom>
+        </p:spPr>
+        <p:txBody>
+          <a:bodyPr wrap="square">
+            <a:spAutoFit/>
+          </a:bodyPr>
+          <a:lstStyle/>
+          <a:p>
+            <a:pPr algn="ctr"/>
+            <a:r>
+              <a:rPr lang="en-US" sz="4000" b="1" dirty="0" smtClean="0">
+                <a:latin typeface="Helvetica Neue"/>
+                <a:cs typeface="Helvetica Neue"/>
+              </a:rPr>
+              <a:t>Web Application requirements</a:t>
+            </a:r>
+            <a:endParaRPr lang="en-US" sz="4000" b="1" dirty="0">
+              <a:latin typeface="Helvetica Neue"/>
+              <a:cs typeface="Helvetica Neue"/>
+            </a:endParaRPr>
+          </a:p>
+        </p:txBody>
+      </p:sp>
+      <p:sp>
+        <p:nvSpPr>
+          <p:cNvPr id="13" name="Rectangle 12"/>
+          <p:cNvSpPr/>
+          <p:nvPr/>
+        </p:nvSpPr>
+        <p:spPr>
+          <a:xfrm>
+            <a:off x="1122632" y="4782533"/>
+            <a:ext cx="6894972" cy="1754327"/>
+          </a:xfrm>
+          <a:prstGeom prst="rect">
+            <a:avLst/>
+          </a:prstGeom>
+        </p:spPr>
+        <p:txBody>
+          <a:bodyPr wrap="square">
+            <a:spAutoFit/>
+          </a:bodyPr>
+          <a:lstStyle/>
+          <a:p>
+            <a:pPr marL="457200" indent="-457200">
+              <a:buFont typeface="Arial"/>
+              <a:buChar char="•"/>
+            </a:pPr>
+            <a:r>
+              <a:rPr lang="en-US" b="1" dirty="0" smtClean="0">
+                <a:latin typeface="Helvetica Neue"/>
+                <a:cs typeface="Helvetica Neue"/>
+              </a:rPr>
+              <a:t>Purpose</a:t>
+            </a:r>
+          </a:p>
+          <a:p>
+            <a:pPr marL="457200" indent="-457200">
+              <a:buFont typeface="Arial"/>
+              <a:buChar char="•"/>
+            </a:pPr>
+            <a:r>
+              <a:rPr lang="en-US" b="1" dirty="0" smtClean="0">
+                <a:latin typeface="Helvetica Neue"/>
+                <a:cs typeface="Helvetica Neue"/>
+              </a:rPr>
+              <a:t>Goals for users</a:t>
+            </a:r>
+          </a:p>
+          <a:p>
+            <a:pPr marL="457200" indent="-457200">
+              <a:buFont typeface="Arial"/>
+              <a:buChar char="•"/>
+            </a:pPr>
+            <a:r>
+              <a:rPr lang="en-US" b="1" dirty="0" smtClean="0">
+                <a:latin typeface="Helvetica Neue"/>
+                <a:cs typeface="Helvetica Neue"/>
+              </a:rPr>
+              <a:t>Marketing</a:t>
+            </a:r>
+          </a:p>
+          <a:p>
+            <a:pPr marL="457200" indent="-457200">
+              <a:buFont typeface="Arial"/>
+              <a:buChar char="•"/>
+            </a:pPr>
+            <a:r>
+              <a:rPr lang="en-US" b="1" dirty="0" smtClean="0">
+                <a:latin typeface="Helvetica Neue"/>
+                <a:cs typeface="Helvetica Neue"/>
+              </a:rPr>
+              <a:t>Target Audience</a:t>
+            </a:r>
+          </a:p>
+          <a:p>
+            <a:pPr marL="457200" indent="-457200">
+              <a:buFont typeface="Arial"/>
+              <a:buChar char="•"/>
+            </a:pPr>
+            <a:r>
+              <a:rPr lang="en-US" b="1" dirty="0" smtClean="0">
+                <a:latin typeface="Helvetica Neue"/>
+                <a:cs typeface="Helvetica Neue"/>
+              </a:rPr>
+              <a:t>Competition / Examples</a:t>
+            </a:r>
+          </a:p>
+          <a:p>
+            <a:pPr marL="457200" indent="-457200">
+              <a:buFont typeface="Arial"/>
+              <a:buChar char="•"/>
+            </a:pPr>
+            <a:r>
+              <a:rPr lang="en-US" b="1" dirty="0" smtClean="0">
+                <a:latin typeface="Helvetica Neue"/>
+                <a:cs typeface="Helvetica Neue"/>
+              </a:rPr>
+              <a:t>Technical Requirements</a:t>
+            </a:r>
+          </a:p>
+        </p:txBody>
+      </p:sp>
     </p:spTree>
     <p:extLst>
       <p:ext uri="{BB962C8B-B14F-4D97-AF65-F5344CB8AC3E}">
-        <p14:creationId xmlns:p14="http://schemas.microsoft.com/office/powerpoint/2010/main" val="2128210943"/>
+        <p14:creationId xmlns:p14="http://schemas.microsoft.com/office/powerpoint/2010/main" val="1876841298"/>
       </p:ext>
     </p:extLst>
   </p:cSld>
@@ -7887,6 +7925,38 @@
       </p:sp>
       <p:sp>
         <p:nvSpPr>
+          <p:cNvPr id="3" name="Rectangle 2"/>
+          <p:cNvSpPr/>
+          <p:nvPr/>
+        </p:nvSpPr>
+        <p:spPr>
+          <a:xfrm>
+            <a:off x="1122632" y="4667074"/>
+            <a:ext cx="6894972" cy="1015663"/>
+          </a:xfrm>
+          <a:prstGeom prst="rect">
+            <a:avLst/>
+          </a:prstGeom>
+        </p:spPr>
+        <p:txBody>
+          <a:bodyPr wrap="square">
+            <a:spAutoFit/>
+          </a:bodyPr>
+          <a:lstStyle/>
+          <a:p>
+            <a:pPr algn="ctr"/>
+            <a:r>
+              <a:rPr lang="en-US" sz="6000" b="1" dirty="0" smtClean="0">
+                <a:latin typeface="Helvetica Neue"/>
+                <a:cs typeface="Helvetica Neue"/>
+              </a:rPr>
+              <a:t>Sitemap</a:t>
+            </a:r>
+          </a:p>
+        </p:txBody>
+      </p:sp>
+      <p:sp>
+        <p:nvSpPr>
           <p:cNvPr id="9" name="Rectangle 8"/>
           <p:cNvSpPr/>
           <p:nvPr/>
@@ -7922,6 +7992,420 @@
           </a:p>
         </p:txBody>
       </p:sp>
+    </p:spTree>
+    <p:extLst>
+      <p:ext uri="{BB962C8B-B14F-4D97-AF65-F5344CB8AC3E}">
+        <p14:creationId xmlns:p14="http://schemas.microsoft.com/office/powerpoint/2010/main" val="2128210943"/>
+      </p:ext>
+    </p:extLst>
+  </p:cSld>
+  <p:clrMapOvr>
+    <a:masterClrMapping/>
+  </p:clrMapOvr>
+</p:sld>
+</file>
+
+<file path=ppt/slides/slide14.xml><?xml version="1.0" encoding="utf-8"?>
+<p:sld xmlns:a="http://schemas.openxmlformats.org/drawingml/2006/main" xmlns:r="http://schemas.openxmlformats.org/officeDocument/2006/relationships" xmlns:p="http://schemas.openxmlformats.org/presentationml/2006/main">
+  <p:cSld>
+    <p:spTree>
+      <p:nvGrpSpPr>
+        <p:cNvPr id="1" name=""/>
+        <p:cNvGrpSpPr/>
+        <p:nvPr/>
+      </p:nvGrpSpPr>
+      <p:grpSpPr>
+        <a:xfrm>
+          <a:off x="0" y="0"/>
+          <a:ext cx="0" cy="0"/>
+          <a:chOff x="0" y="0"/>
+          <a:chExt cx="0" cy="0"/>
+        </a:xfrm>
+      </p:grpSpPr>
+      <p:grpSp>
+        <p:nvGrpSpPr>
+          <p:cNvPr id="11" name="Group 10"/>
+          <p:cNvGrpSpPr/>
+          <p:nvPr/>
+        </p:nvGrpSpPr>
+        <p:grpSpPr>
+          <a:xfrm>
+            <a:off x="0" y="0"/>
+            <a:ext cx="9144000" cy="699840"/>
+            <a:chOff x="-12700" y="1041400"/>
+            <a:chExt cx="9144000" cy="699840"/>
+          </a:xfrm>
+        </p:grpSpPr>
+        <p:sp>
+          <p:nvSpPr>
+            <p:cNvPr id="5" name="Rectangle 4"/>
+            <p:cNvSpPr/>
+            <p:nvPr/>
+          </p:nvSpPr>
+          <p:spPr>
+            <a:xfrm>
+              <a:off x="-12700" y="1041400"/>
+              <a:ext cx="9144000" cy="699840"/>
+            </a:xfrm>
+            <a:prstGeom prst="rect">
+              <a:avLst/>
+            </a:prstGeom>
+            <a:solidFill>
+              <a:srgbClr val="57068C"/>
+            </a:solidFill>
+            <a:ln>
+              <a:noFill/>
+            </a:ln>
+          </p:spPr>
+          <p:style>
+            <a:lnRef idx="1">
+              <a:schemeClr val="accent1"/>
+            </a:lnRef>
+            <a:fillRef idx="3">
+              <a:schemeClr val="accent1"/>
+            </a:fillRef>
+            <a:effectRef idx="2">
+              <a:schemeClr val="accent1"/>
+            </a:effectRef>
+            <a:fontRef idx="minor">
+              <a:schemeClr val="lt1"/>
+            </a:fontRef>
+          </p:style>
+          <p:txBody>
+            <a:bodyPr anchor="ctr"/>
+            <a:lstStyle/>
+            <a:p>
+              <a:pPr>
+                <a:spcBef>
+                  <a:spcPct val="0"/>
+                </a:spcBef>
+              </a:pPr>
+              <a:endParaRPr lang="en-US" sz="1000" dirty="0">
+                <a:latin typeface="Helvetica Neue"/>
+                <a:cs typeface="Helvetica Neue"/>
+              </a:endParaRPr>
+            </a:p>
+          </p:txBody>
+        </p:sp>
+        <p:sp>
+          <p:nvSpPr>
+            <p:cNvPr id="6" name="Text Placeholder 2"/>
+            <p:cNvSpPr txBox="1">
+              <a:spLocks/>
+            </p:cNvSpPr>
+            <p:nvPr/>
+          </p:nvSpPr>
+          <p:spPr bwMode="auto">
+            <a:xfrm>
+              <a:off x="6829910" y="1284442"/>
+              <a:ext cx="2094097" cy="228599"/>
+            </a:xfrm>
+            <a:prstGeom prst="rect">
+              <a:avLst/>
+            </a:prstGeom>
+            <a:noFill/>
+            <a:extLst>
+              <a:ext uri="{909E8E84-426E-40dd-AFC4-6F175D3DCCD1}">
+                <a14:hiddenFill xmlns:a14="http://schemas.microsoft.com/office/drawing/2010/main">
+                  <a:solidFill>
+                    <a:srgbClr val="FFFFFF"/>
+                  </a:solidFill>
+                </a14:hiddenFill>
+              </a:ext>
+              <a:ext uri="{91240B29-F687-4f45-9708-019B960494DF}">
+                <a14:hiddenLine xmlns:a14="http://schemas.microsoft.com/office/drawing/2010/main" w="9525">
+                  <a:solidFill>
+                    <a:srgbClr val="000000"/>
+                  </a:solidFill>
+                  <a:miter lim="800000"/>
+                  <a:headEnd/>
+                  <a:tailEnd/>
+                </a14:hiddenLine>
+              </a:ext>
+            </a:extLst>
+          </p:spPr>
+          <p:txBody>
+            <a:bodyPr vert="horz" wrap="square" lIns="91440" tIns="45720" rIns="91440" bIns="45720" numCol="1" rtlCol="0" anchor="ctr" compatLnSpc="1">
+              <a:prstTxWarp prst="textNoShape">
+                <a:avLst/>
+              </a:prstTxWarp>
+            </a:bodyPr>
+            <a:lstStyle>
+              <a:defPPr>
+                <a:defRPr lang="en-US"/>
+              </a:defPPr>
+              <a:lvl1pPr marL="0" algn="ctr" defTabSz="914400" rtl="0" eaLnBrk="1" latinLnBrk="0" hangingPunct="1">
+                <a:defRPr sz="1200" kern="1200">
+                  <a:solidFill>
+                    <a:schemeClr val="tx1">
+                      <a:tint val="75000"/>
+                    </a:schemeClr>
+                  </a:solidFill>
+                  <a:latin typeface="+mn-lt"/>
+                  <a:ea typeface="+mn-ea"/>
+                  <a:cs typeface="+mn-cs"/>
+                </a:defRPr>
+              </a:lvl1pPr>
+              <a:lvl2pPr marL="457200" algn="l" defTabSz="914400" rtl="0" eaLnBrk="1" latinLnBrk="0" hangingPunct="1">
+                <a:defRPr sz="1800" kern="1200">
+                  <a:solidFill>
+                    <a:schemeClr val="tx1"/>
+                  </a:solidFill>
+                  <a:latin typeface="+mn-lt"/>
+                  <a:ea typeface="+mn-ea"/>
+                  <a:cs typeface="+mn-cs"/>
+                </a:defRPr>
+              </a:lvl2pPr>
+              <a:lvl3pPr marL="914400" algn="l" defTabSz="914400" rtl="0" eaLnBrk="1" latinLnBrk="0" hangingPunct="1">
+                <a:defRPr sz="1800" kern="1200">
+                  <a:solidFill>
+                    <a:schemeClr val="tx1"/>
+                  </a:solidFill>
+                  <a:latin typeface="+mn-lt"/>
+                  <a:ea typeface="+mn-ea"/>
+                  <a:cs typeface="+mn-cs"/>
+                </a:defRPr>
+              </a:lvl3pPr>
+              <a:lvl4pPr marL="1371600" algn="l" defTabSz="914400" rtl="0" eaLnBrk="1" latinLnBrk="0" hangingPunct="1">
+                <a:defRPr sz="1800" kern="1200">
+                  <a:solidFill>
+                    <a:schemeClr val="tx1"/>
+                  </a:solidFill>
+                  <a:latin typeface="+mn-lt"/>
+                  <a:ea typeface="+mn-ea"/>
+                  <a:cs typeface="+mn-cs"/>
+                </a:defRPr>
+              </a:lvl4pPr>
+              <a:lvl5pPr marL="1828800" algn="l" defTabSz="914400" rtl="0" eaLnBrk="1" latinLnBrk="0" hangingPunct="1">
+                <a:defRPr sz="1800" kern="1200">
+                  <a:solidFill>
+                    <a:schemeClr val="tx1"/>
+                  </a:solidFill>
+                  <a:latin typeface="+mn-lt"/>
+                  <a:ea typeface="+mn-ea"/>
+                  <a:cs typeface="+mn-cs"/>
+                </a:defRPr>
+              </a:lvl5pPr>
+              <a:lvl6pPr marL="2286000" algn="l" defTabSz="914400" rtl="0" eaLnBrk="1" latinLnBrk="0" hangingPunct="1">
+                <a:defRPr sz="1800" kern="1200">
+                  <a:solidFill>
+                    <a:schemeClr val="tx1"/>
+                  </a:solidFill>
+                  <a:latin typeface="+mn-lt"/>
+                  <a:ea typeface="+mn-ea"/>
+                  <a:cs typeface="+mn-cs"/>
+                </a:defRPr>
+              </a:lvl6pPr>
+              <a:lvl7pPr marL="2743200" algn="l" defTabSz="914400" rtl="0" eaLnBrk="1" latinLnBrk="0" hangingPunct="1">
+                <a:defRPr sz="1800" kern="1200">
+                  <a:solidFill>
+                    <a:schemeClr val="tx1"/>
+                  </a:solidFill>
+                  <a:latin typeface="+mn-lt"/>
+                  <a:ea typeface="+mn-ea"/>
+                  <a:cs typeface="+mn-cs"/>
+                </a:defRPr>
+              </a:lvl7pPr>
+              <a:lvl8pPr marL="3200400" algn="l" defTabSz="914400" rtl="0" eaLnBrk="1" latinLnBrk="0" hangingPunct="1">
+                <a:defRPr sz="1800" kern="1200">
+                  <a:solidFill>
+                    <a:schemeClr val="tx1"/>
+                  </a:solidFill>
+                  <a:latin typeface="+mn-lt"/>
+                  <a:ea typeface="+mn-ea"/>
+                  <a:cs typeface="+mn-cs"/>
+                </a:defRPr>
+              </a:lvl8pPr>
+              <a:lvl9pPr marL="3657600" algn="l" defTabSz="914400" rtl="0" eaLnBrk="1" latinLnBrk="0" hangingPunct="1">
+                <a:defRPr sz="1800" kern="1200">
+                  <a:solidFill>
+                    <a:schemeClr val="tx1"/>
+                  </a:solidFill>
+                  <a:latin typeface="+mn-lt"/>
+                  <a:ea typeface="+mn-ea"/>
+                  <a:cs typeface="+mn-cs"/>
+                </a:defRPr>
+              </a:lvl9pPr>
+            </a:lstStyle>
+            <a:p>
+              <a:pPr algn="r">
+                <a:spcBef>
+                  <a:spcPct val="0"/>
+                </a:spcBef>
+              </a:pPr>
+              <a:r>
+                <a:rPr lang="en-US" sz="1000" b="1" dirty="0" smtClean="0">
+                  <a:latin typeface="Helvetica Neue"/>
+                  <a:cs typeface="Helvetica Neue"/>
+                </a:rPr>
+                <a:t>Development </a:t>
+              </a:r>
+              <a:r>
+                <a:rPr lang="en-US" sz="1000" b="1" dirty="0">
+                  <a:latin typeface="Helvetica Neue"/>
+                  <a:cs typeface="Helvetica Neue"/>
+                </a:rPr>
+                <a:t>Environment </a:t>
+              </a:r>
+              <a:r>
+                <a:rPr lang="en-US" sz="1000" b="1" dirty="0" smtClean="0">
+                  <a:latin typeface="Helvetica Neue"/>
+                  <a:cs typeface="Helvetica Neue"/>
+                </a:rPr>
+                <a:t>&amp;</a:t>
+              </a:r>
+            </a:p>
+            <a:p>
+              <a:pPr algn="r">
+                <a:spcBef>
+                  <a:spcPct val="0"/>
+                </a:spcBef>
+              </a:pPr>
+              <a:r>
+                <a:rPr lang="en-US" sz="1000" b="1" dirty="0" smtClean="0">
+                  <a:latin typeface="Helvetica Neue"/>
+                  <a:cs typeface="Helvetica Neue"/>
+                </a:rPr>
+                <a:t>Version </a:t>
+              </a:r>
+              <a:r>
+                <a:rPr lang="en-US" sz="1000" b="1" dirty="0">
+                  <a:latin typeface="Helvetica Neue"/>
+                  <a:cs typeface="Helvetica Neue"/>
+                </a:rPr>
+                <a:t>Control</a:t>
+              </a:r>
+            </a:p>
+          </p:txBody>
+        </p:sp>
+        <p:pic>
+          <p:nvPicPr>
+            <p:cNvPr id="8" name="Picture 6"/>
+            <p:cNvPicPr>
+              <a:picLocks noChangeAspect="1"/>
+            </p:cNvPicPr>
+            <p:nvPr/>
+          </p:nvPicPr>
+          <p:blipFill>
+            <a:blip r:embed="rId3">
+              <a:extLst>
+                <a:ext uri="{28A0092B-C50C-407E-A947-70E740481C1C}">
+                  <a14:useLocalDpi xmlns:a14="http://schemas.microsoft.com/office/drawing/2010/main" val="0"/>
+                </a:ext>
+              </a:extLst>
+            </a:blip>
+            <a:srcRect/>
+            <a:stretch>
+              <a:fillRect/>
+            </a:stretch>
+          </p:blipFill>
+          <p:spPr bwMode="auto">
+            <a:xfrm>
+              <a:off x="257175" y="1284442"/>
+              <a:ext cx="1465263" cy="228600"/>
+            </a:xfrm>
+            <a:prstGeom prst="rect">
+              <a:avLst/>
+            </a:prstGeom>
+            <a:noFill/>
+            <a:ln>
+              <a:noFill/>
+            </a:ln>
+            <a:extLst>
+              <a:ext uri="{909E8E84-426E-40dd-AFC4-6F175D3DCCD1}">
+                <a14:hiddenFill xmlns:a14="http://schemas.microsoft.com/office/drawing/2010/main">
+                  <a:solidFill>
+                    <a:srgbClr val="FFFFFF"/>
+                  </a:solidFill>
+                </a14:hiddenFill>
+              </a:ext>
+              <a:ext uri="{91240B29-F687-4f45-9708-019B960494DF}">
+                <a14:hiddenLine xmlns:a14="http://schemas.microsoft.com/office/drawing/2010/main" w="9525">
+                  <a:solidFill>
+                    <a:srgbClr val="000000"/>
+                  </a:solidFill>
+                  <a:miter lim="800000"/>
+                  <a:headEnd/>
+                  <a:tailEnd/>
+                </a14:hiddenLine>
+              </a:ext>
+            </a:extLst>
+          </p:spPr>
+        </p:pic>
+      </p:grpSp>
+      <p:sp>
+        <p:nvSpPr>
+          <p:cNvPr id="2" name="Rectangle 1"/>
+          <p:cNvSpPr/>
+          <p:nvPr/>
+        </p:nvSpPr>
+        <p:spPr>
+          <a:xfrm>
+            <a:off x="269876" y="1343534"/>
+            <a:ext cx="8666831" cy="553998"/>
+          </a:xfrm>
+          <a:prstGeom prst="rect">
+            <a:avLst/>
+          </a:prstGeom>
+        </p:spPr>
+        <p:txBody>
+          <a:bodyPr wrap="square">
+            <a:spAutoFit/>
+          </a:bodyPr>
+          <a:lstStyle/>
+          <a:p>
+            <a:pPr algn="ctr"/>
+            <a:r>
+              <a:rPr lang="en-US" sz="3000" b="1" dirty="0" smtClean="0">
+                <a:latin typeface="Helvetica Neue"/>
+                <a:cs typeface="Helvetica Neue"/>
+              </a:rPr>
+              <a:t>Semester Project</a:t>
+            </a:r>
+            <a:endParaRPr lang="en-US" sz="3000" b="1" dirty="0">
+              <a:latin typeface="Helvetica Neue"/>
+              <a:cs typeface="Helvetica Neue"/>
+            </a:endParaRPr>
+          </a:p>
+        </p:txBody>
+      </p:sp>
+      <p:sp>
+        <p:nvSpPr>
+          <p:cNvPr id="9" name="Rectangle 8"/>
+          <p:cNvSpPr/>
+          <p:nvPr/>
+        </p:nvSpPr>
+        <p:spPr>
+          <a:xfrm>
+            <a:off x="269876" y="1921222"/>
+            <a:ext cx="8666831" cy="369332"/>
+          </a:xfrm>
+          <a:prstGeom prst="rect">
+            <a:avLst/>
+          </a:prstGeom>
+        </p:spPr>
+        <p:txBody>
+          <a:bodyPr wrap="square">
+            <a:spAutoFit/>
+          </a:bodyPr>
+          <a:lstStyle/>
+          <a:p>
+            <a:pPr algn="ctr"/>
+            <a:r>
+              <a:rPr lang="en-US" b="1" dirty="0"/>
+              <a:t>Pre-development Process</a:t>
+            </a:r>
+            <a:r>
+              <a:rPr lang="en-US" dirty="0"/>
+              <a:t> </a:t>
+            </a:r>
+            <a:endParaRPr lang="en-US" b="1" dirty="0">
+              <a:latin typeface="Helvetica Neue"/>
+              <a:cs typeface="Helvetica Neue"/>
+            </a:endParaRPr>
+          </a:p>
+        </p:txBody>
+      </p:sp>
       <p:sp>
         <p:nvSpPr>
           <p:cNvPr id="10" name="Rectangle 9"/>
@@ -8019,7 +8503,7 @@
 </p:sld>
 </file>
 
-<file path=ppt/slides/slide14.xml><?xml version="1.0" encoding="utf-8"?>
+<file path=ppt/slides/slide15.xml><?xml version="1.0" encoding="utf-8"?>
 <p:sld xmlns:a="http://schemas.openxmlformats.org/drawingml/2006/main" xmlns:r="http://schemas.openxmlformats.org/officeDocument/2006/relationships" xmlns:p="http://schemas.openxmlformats.org/presentationml/2006/main">
   <p:cSld>
     <p:spTree>
@@ -8816,18 +9300,11 @@
           <a:p>
             <a:pPr algn="ctr"/>
             <a:r>
-              <a:rPr lang="en-US" sz="3000" b="1" dirty="0">
-                <a:latin typeface="Helvetica Neue"/>
-                <a:cs typeface="Helvetica Neue"/>
-              </a:rPr>
-              <a:t>Development </a:t>
-            </a:r>
-            <a:r>
               <a:rPr lang="en-US" sz="3000" b="1" dirty="0" smtClean="0">
                 <a:latin typeface="Helvetica Neue"/>
                 <a:cs typeface="Helvetica Neue"/>
               </a:rPr>
-              <a:t>Environment </a:t>
+              <a:t>Programming Assignment 1</a:t>
             </a:r>
             <a:endParaRPr lang="en-US" sz="3000" b="1" dirty="0">
               <a:latin typeface="Helvetica Neue"/>
@@ -8836,59 +9313,200 @@
           </a:p>
         </p:txBody>
       </p:sp>
-      <p:sp>
-        <p:nvSpPr>
-          <p:cNvPr id="3" name="Rectangle 2"/>
-          <p:cNvSpPr/>
+      <p:grpSp>
+        <p:nvGrpSpPr>
+          <p:cNvPr id="9" name="Group 8"/>
+          <p:cNvGrpSpPr/>
           <p:nvPr/>
-        </p:nvSpPr>
-        <p:spPr>
+        </p:nvGrpSpPr>
+        <p:grpSpPr>
           <a:xfrm>
-            <a:off x="1122632" y="4668528"/>
-            <a:ext cx="6894972" cy="646331"/>
+            <a:off x="1125711" y="4292097"/>
+            <a:ext cx="7225721" cy="1924378"/>
+            <a:chOff x="1125711" y="4479356"/>
+            <a:chExt cx="7225721" cy="1924378"/>
           </a:xfrm>
-          <a:prstGeom prst="rect">
-            <a:avLst/>
-          </a:prstGeom>
-        </p:spPr>
-        <p:txBody>
-          <a:bodyPr wrap="square">
-            <a:spAutoFit/>
-          </a:bodyPr>
-          <a:lstStyle/>
-          <a:p>
-            <a:pPr marL="457200" indent="-457200">
-              <a:buFont typeface="Arial"/>
-              <a:buChar char="•"/>
-            </a:pPr>
-            <a:r>
-              <a:rPr lang="en-US" b="1" dirty="0" smtClean="0">
-                <a:latin typeface="Helvetica Neue"/>
-                <a:cs typeface="Helvetica Neue"/>
-              </a:rPr>
-              <a:t>Server Environment</a:t>
-            </a:r>
-          </a:p>
-          <a:p>
-            <a:pPr marL="457200" indent="-457200">
-              <a:buFont typeface="Arial"/>
-              <a:buChar char="•"/>
-            </a:pPr>
-            <a:r>
-              <a:rPr lang="en-US" b="1" dirty="0" smtClean="0">
-                <a:latin typeface="Helvetica Neue"/>
-                <a:cs typeface="Helvetica Neue"/>
-              </a:rPr>
-              <a:t>Developer Environment</a:t>
-            </a:r>
-            <a:endParaRPr lang="en-US" dirty="0"/>
-          </a:p>
-        </p:txBody>
-      </p:sp>
+        </p:grpSpPr>
+        <p:sp>
+          <p:nvSpPr>
+            <p:cNvPr id="4" name="Rectangle 3"/>
+            <p:cNvSpPr/>
+            <p:nvPr/>
+          </p:nvSpPr>
+          <p:spPr>
+            <a:xfrm>
+              <a:off x="1125711" y="4479356"/>
+              <a:ext cx="7225721" cy="1924378"/>
+            </a:xfrm>
+            <a:prstGeom prst="rect">
+              <a:avLst/>
+            </a:prstGeom>
+            <a:solidFill>
+              <a:schemeClr val="tx1"/>
+            </a:solidFill>
+          </p:spPr>
+          <p:style>
+            <a:lnRef idx="1">
+              <a:schemeClr val="dk1"/>
+            </a:lnRef>
+            <a:fillRef idx="3">
+              <a:schemeClr val="dk1"/>
+            </a:fillRef>
+            <a:effectRef idx="2">
+              <a:schemeClr val="dk1"/>
+            </a:effectRef>
+            <a:fontRef idx="minor">
+              <a:schemeClr val="lt1"/>
+            </a:fontRef>
+          </p:style>
+          <p:txBody>
+            <a:bodyPr rtlCol="0" anchor="ctr"/>
+            <a:lstStyle/>
+            <a:p>
+              <a:pPr algn="ctr"/>
+              <a:endParaRPr lang="en-US"/>
+            </a:p>
+          </p:txBody>
+        </p:sp>
+        <p:sp>
+          <p:nvSpPr>
+            <p:cNvPr id="7" name="TextBox 6"/>
+            <p:cNvSpPr txBox="1"/>
+            <p:nvPr/>
+          </p:nvSpPr>
+          <p:spPr>
+            <a:xfrm>
+              <a:off x="1327762" y="4710282"/>
+              <a:ext cx="6888969" cy="1477328"/>
+            </a:xfrm>
+            <a:prstGeom prst="rect">
+              <a:avLst/>
+            </a:prstGeom>
+            <a:noFill/>
+          </p:spPr>
+          <p:txBody>
+            <a:bodyPr wrap="square" rtlCol="0">
+              <a:spAutoFit/>
+            </a:bodyPr>
+            <a:lstStyle/>
+            <a:p>
+              <a:r>
+                <a:rPr lang="en-US" dirty="0">
+                  <a:solidFill>
+                    <a:schemeClr val="bg1"/>
+                  </a:solidFill>
+                  <a:latin typeface="Consolas"/>
+                  <a:cs typeface="Consolas"/>
+                </a:rPr>
+                <a:t>&lt;?</a:t>
+              </a:r>
+              <a:r>
+                <a:rPr lang="en-US" dirty="0" err="1">
+                  <a:solidFill>
+                    <a:schemeClr val="bg1"/>
+                  </a:solidFill>
+                  <a:latin typeface="Consolas"/>
+                  <a:cs typeface="Consolas"/>
+                </a:rPr>
+                <a:t>php</a:t>
+              </a:r>
+              <a:endParaRPr lang="en-US" dirty="0">
+                <a:solidFill>
+                  <a:schemeClr val="bg1"/>
+                </a:solidFill>
+                <a:latin typeface="Consolas"/>
+                <a:cs typeface="Consolas"/>
+              </a:endParaRPr>
+            </a:p>
+            <a:p>
+              <a:endParaRPr lang="en-US" dirty="0">
+                <a:solidFill>
+                  <a:schemeClr val="bg1"/>
+                </a:solidFill>
+                <a:latin typeface="Consolas"/>
+                <a:cs typeface="Consolas"/>
+              </a:endParaRPr>
+            </a:p>
+            <a:p>
+              <a:r>
+                <a:rPr lang="en-US" dirty="0">
+                  <a:solidFill>
+                    <a:schemeClr val="bg1"/>
+                  </a:solidFill>
+                  <a:latin typeface="Consolas"/>
+                  <a:cs typeface="Consolas"/>
+                </a:rPr>
+                <a:t>Route::get('/', function () {</a:t>
+              </a:r>
+            </a:p>
+            <a:p>
+              <a:r>
+                <a:rPr lang="en-US" dirty="0">
+                  <a:solidFill>
+                    <a:schemeClr val="bg1"/>
+                  </a:solidFill>
+                  <a:latin typeface="Consolas"/>
+                  <a:cs typeface="Consolas"/>
+                </a:rPr>
+                <a:t>    return view('Hello from </a:t>
+              </a:r>
+              <a:r>
+                <a:rPr lang="en-US" dirty="0" smtClean="0">
+                  <a:solidFill>
+                    <a:schemeClr val="bg1"/>
+                  </a:solidFill>
+                  <a:latin typeface="Consolas"/>
+                  <a:cs typeface="Consolas"/>
+                </a:rPr>
+                <a:t>Random Student'</a:t>
+              </a:r>
+              <a:r>
+                <a:rPr lang="en-US" dirty="0">
+                  <a:solidFill>
+                    <a:schemeClr val="bg1"/>
+                  </a:solidFill>
+                  <a:latin typeface="Consolas"/>
+                  <a:cs typeface="Consolas"/>
+                </a:rPr>
+                <a:t>);</a:t>
+              </a:r>
+            </a:p>
+            <a:p>
+              <a:r>
+                <a:rPr lang="en-US" dirty="0">
+                  <a:solidFill>
+                    <a:schemeClr val="bg1"/>
+                  </a:solidFill>
+                  <a:latin typeface="Consolas"/>
+                  <a:cs typeface="Consolas"/>
+                </a:rPr>
+                <a:t>})</a:t>
+              </a:r>
+              <a:r>
+                <a:rPr lang="en-US" dirty="0" smtClean="0">
+                  <a:solidFill>
+                    <a:schemeClr val="bg1"/>
+                  </a:solidFill>
+                  <a:latin typeface="Consolas"/>
+                  <a:cs typeface="Consolas"/>
+                </a:rPr>
+                <a:t>;</a:t>
+              </a:r>
+              <a:endParaRPr lang="en-US" dirty="0">
+                <a:solidFill>
+                  <a:schemeClr val="bg1"/>
+                </a:solidFill>
+                <a:latin typeface="Consolas"/>
+                <a:cs typeface="Consolas"/>
+              </a:endParaRPr>
+            </a:p>
+          </p:txBody>
+        </p:sp>
+      </p:grpSp>
     </p:spTree>
     <p:extLst>
       <p:ext uri="{BB962C8B-B14F-4D97-AF65-F5344CB8AC3E}">
-        <p14:creationId xmlns:p14="http://schemas.microsoft.com/office/powerpoint/2010/main" val="1955412764"/>
+        <p14:creationId xmlns:p14="http://schemas.microsoft.com/office/powerpoint/2010/main" val="4283343312"/>
       </p:ext>
     </p:extLst>
   </p:cSld>
@@ -9180,7 +9798,7 @@
             <p:nvPr/>
           </p:nvPicPr>
           <p:blipFill>
-            <a:blip r:embed="rId3">
+            <a:blip r:embed="rId2">
               <a:extLst>
                 <a:ext uri="{28A0092B-C50C-407E-A947-70E740481C1C}">
                   <a14:useLocalDpi xmlns:a14="http://schemas.microsoft.com/office/drawing/2010/main" val="0"/>
@@ -9278,7 +9896,7 @@
         <p:spPr>
           <a:xfrm>
             <a:off x="1122632" y="4668528"/>
-            <a:ext cx="6894972" cy="1754327"/>
+            <a:ext cx="6894972" cy="646331"/>
           </a:xfrm>
           <a:prstGeom prst="rect">
             <a:avLst/>
@@ -9299,7 +9917,7 @@
                 <a:latin typeface="Helvetica Neue"/>
                 <a:cs typeface="Helvetica Neue"/>
               </a:rPr>
-              <a:t>Web Server</a:t>
+              <a:t>Server Environment</a:t>
             </a:r>
           </a:p>
           <a:p>
@@ -9312,104 +9930,16 @@
                 <a:latin typeface="Helvetica Neue"/>
                 <a:cs typeface="Helvetica Neue"/>
               </a:rPr>
-              <a:t>Database Server</a:t>
-            </a:r>
-          </a:p>
-          <a:p>
-            <a:pPr marL="457200" indent="-457200">
-              <a:buFont typeface="Arial"/>
-              <a:buChar char="•"/>
-            </a:pPr>
-            <a:r>
-              <a:rPr lang="en-US" b="1" dirty="0" smtClean="0">
-                <a:latin typeface="Helvetica Neue"/>
-                <a:cs typeface="Helvetica Neue"/>
-              </a:rPr>
-              <a:t>Scripting Languages</a:t>
-            </a:r>
-          </a:p>
-          <a:p>
-            <a:pPr marL="457200" indent="-457200">
-              <a:buFont typeface="Arial"/>
-              <a:buChar char="•"/>
-            </a:pPr>
-            <a:r>
-              <a:rPr lang="en-US" b="1" dirty="0" smtClean="0">
-                <a:latin typeface="Helvetica Neue"/>
-                <a:cs typeface="Helvetica Neue"/>
-              </a:rPr>
-              <a:t>Supporting Libraries</a:t>
-            </a:r>
-          </a:p>
-          <a:p>
-            <a:pPr marL="457200" indent="-457200">
-              <a:buFont typeface="Arial"/>
-              <a:buChar char="•"/>
-            </a:pPr>
-            <a:r>
-              <a:rPr lang="en-US" b="1" dirty="0" smtClean="0">
-                <a:latin typeface="Helvetica Neue"/>
-                <a:cs typeface="Helvetica Neue"/>
-              </a:rPr>
-              <a:t>Access to server</a:t>
-            </a:r>
-          </a:p>
-          <a:p>
-            <a:pPr marL="457200" indent="-457200">
-              <a:buFont typeface="Arial"/>
-              <a:buChar char="•"/>
-            </a:pPr>
-            <a:r>
-              <a:rPr lang="en-US" b="1" dirty="0" smtClean="0">
-                <a:latin typeface="Helvetica Neue"/>
-                <a:cs typeface="Helvetica Neue"/>
-              </a:rPr>
-              <a:t>Access to database</a:t>
+              <a:t>Developer Environment</a:t>
             </a:r>
             <a:endParaRPr lang="en-US" dirty="0"/>
-          </a:p>
-        </p:txBody>
-      </p:sp>
-      <p:sp>
-        <p:nvSpPr>
-          <p:cNvPr id="9" name="Rectangle 8"/>
-          <p:cNvSpPr/>
-          <p:nvPr/>
-        </p:nvSpPr>
-        <p:spPr>
-          <a:xfrm>
-            <a:off x="269876" y="1921222"/>
-            <a:ext cx="8666831" cy="369332"/>
-          </a:xfrm>
-          <a:prstGeom prst="rect">
-            <a:avLst/>
-          </a:prstGeom>
-        </p:spPr>
-        <p:txBody>
-          <a:bodyPr wrap="square">
-            <a:spAutoFit/>
-          </a:bodyPr>
-          <a:lstStyle/>
-          <a:p>
-            <a:pPr algn="ctr"/>
-            <a:r>
-              <a:rPr lang="en-US" b="1" dirty="0" smtClean="0">
-                <a:latin typeface="Helvetica Neue"/>
-                <a:cs typeface="Helvetica Neue"/>
-              </a:rPr>
-              <a:t>Server</a:t>
-            </a:r>
-            <a:endParaRPr lang="en-US" b="1" dirty="0">
-              <a:latin typeface="Helvetica Neue"/>
-              <a:cs typeface="Helvetica Neue"/>
-            </a:endParaRPr>
           </a:p>
         </p:txBody>
       </p:sp>
     </p:spTree>
     <p:extLst>
       <p:ext uri="{BB962C8B-B14F-4D97-AF65-F5344CB8AC3E}">
-        <p14:creationId xmlns:p14="http://schemas.microsoft.com/office/powerpoint/2010/main" val="1270786025"/>
+        <p14:creationId xmlns:p14="http://schemas.microsoft.com/office/powerpoint/2010/main" val="1955412764"/>
       </p:ext>
     </p:extLst>
   </p:cSld>
@@ -9799,7 +10329,7 @@
         <p:spPr>
           <a:xfrm>
             <a:off x="1122632" y="4668528"/>
-            <a:ext cx="6894972" cy="1200329"/>
+            <a:ext cx="6894972" cy="1754327"/>
           </a:xfrm>
           <a:prstGeom prst="rect">
             <a:avLst/>
@@ -9820,7 +10350,7 @@
                 <a:latin typeface="Helvetica Neue"/>
                 <a:cs typeface="Helvetica Neue"/>
               </a:rPr>
-              <a:t>Text Editor / IDE</a:t>
+              <a:t>Web Server</a:t>
             </a:r>
           </a:p>
           <a:p>
@@ -9833,7 +10363,7 @@
                 <a:latin typeface="Helvetica Neue"/>
                 <a:cs typeface="Helvetica Neue"/>
               </a:rPr>
-              <a:t>File Transfer Client</a:t>
+              <a:t>Database Server</a:t>
             </a:r>
           </a:p>
           <a:p>
@@ -9846,7 +10376,7 @@
                 <a:latin typeface="Helvetica Neue"/>
                 <a:cs typeface="Helvetica Neue"/>
               </a:rPr>
-              <a:t>SSH Client</a:t>
+              <a:t>Scripting Languages</a:t>
             </a:r>
           </a:p>
           <a:p>
@@ -9855,18 +10385,37 @@
               <a:buChar char="•"/>
             </a:pPr>
             <a:r>
-              <a:rPr lang="en-US" b="1" dirty="0" err="1" smtClean="0">
-                <a:latin typeface="Helvetica Neue"/>
-                <a:cs typeface="Helvetica Neue"/>
-              </a:rPr>
-              <a:t>Git</a:t>
-            </a:r>
-            <a:r>
               <a:rPr lang="en-US" b="1" dirty="0" smtClean="0">
                 <a:latin typeface="Helvetica Neue"/>
                 <a:cs typeface="Helvetica Neue"/>
               </a:rPr>
-              <a:t> Client</a:t>
+              <a:t>Supporting Libraries</a:t>
+            </a:r>
+          </a:p>
+          <a:p>
+            <a:pPr marL="457200" indent="-457200">
+              <a:buFont typeface="Arial"/>
+              <a:buChar char="•"/>
+            </a:pPr>
+            <a:r>
+              <a:rPr lang="en-US" b="1" dirty="0" smtClean="0">
+                <a:latin typeface="Helvetica Neue"/>
+                <a:cs typeface="Helvetica Neue"/>
+              </a:rPr>
+              <a:t>Access to server</a:t>
+            </a:r>
+          </a:p>
+          <a:p>
+            <a:pPr marL="457200" indent="-457200">
+              <a:buFont typeface="Arial"/>
+              <a:buChar char="•"/>
+            </a:pPr>
+            <a:r>
+              <a:rPr lang="en-US" b="1" dirty="0" smtClean="0">
+                <a:latin typeface="Helvetica Neue"/>
+                <a:cs typeface="Helvetica Neue"/>
+              </a:rPr>
+              <a:t>Access to database</a:t>
             </a:r>
             <a:endParaRPr lang="en-US" dirty="0"/>
           </a:p>
@@ -9899,7 +10448,7 @@
                 <a:latin typeface="Helvetica Neue"/>
                 <a:cs typeface="Helvetica Neue"/>
               </a:rPr>
-              <a:t>Developer</a:t>
+              <a:t>Server</a:t>
             </a:r>
             <a:endParaRPr lang="en-US" b="1" dirty="0">
               <a:latin typeface="Helvetica Neue"/>
@@ -9911,7 +10460,7 @@
     </p:spTree>
     <p:extLst>
       <p:ext uri="{BB962C8B-B14F-4D97-AF65-F5344CB8AC3E}">
-        <p14:creationId xmlns:p14="http://schemas.microsoft.com/office/powerpoint/2010/main" val="2564505050"/>
+        <p14:creationId xmlns:p14="http://schemas.microsoft.com/office/powerpoint/2010/main" val="1270786025"/>
       </p:ext>
     </p:extLst>
   </p:cSld>
@@ -10272,11 +10821,18 @@
           <a:p>
             <a:pPr algn="ctr"/>
             <a:r>
+              <a:rPr lang="en-US" sz="3000" b="1" dirty="0">
+                <a:latin typeface="Helvetica Neue"/>
+                <a:cs typeface="Helvetica Neue"/>
+              </a:rPr>
+              <a:t>Development </a:t>
+            </a:r>
+            <a:r>
               <a:rPr lang="en-US" sz="3000" b="1" dirty="0" smtClean="0">
                 <a:latin typeface="Helvetica Neue"/>
                 <a:cs typeface="Helvetica Neue"/>
               </a:rPr>
-              <a:t>Version Control</a:t>
+              <a:t>Environment </a:t>
             </a:r>
             <a:endParaRPr lang="en-US" sz="3000" b="1" dirty="0">
               <a:latin typeface="Helvetica Neue"/>
@@ -10294,7 +10850,7 @@
         <p:spPr>
           <a:xfrm>
             <a:off x="1122632" y="4668528"/>
-            <a:ext cx="6894972" cy="923330"/>
+            <a:ext cx="6894972" cy="1200329"/>
           </a:xfrm>
           <a:prstGeom prst="rect">
             <a:avLst/>
@@ -10306,33 +10862,97 @@
           </a:bodyPr>
           <a:lstStyle/>
           <a:p>
-            <a:pPr>
-              <a:spcBef>
-                <a:spcPct val="0"/>
-              </a:spcBef>
+            <a:pPr marL="457200" indent="-457200">
+              <a:buFont typeface="Arial"/>
+              <a:buChar char="•"/>
             </a:pPr>
             <a:r>
-              <a:rPr lang="en-US" dirty="0">
+              <a:rPr lang="en-US" b="1" dirty="0" smtClean="0">
                 <a:latin typeface="Helvetica Neue"/>
                 <a:cs typeface="Helvetica Neue"/>
               </a:rPr>
-              <a:t>Version control is used to maintain code, document each commit and revert to previous versions when necessary. </a:t>
-            </a:r>
-            <a:r>
-              <a:rPr lang="en-US" dirty="0" err="1">
+              <a:t>Text Editor / IDE</a:t>
+            </a:r>
+          </a:p>
+          <a:p>
+            <a:pPr marL="457200" indent="-457200">
+              <a:buFont typeface="Arial"/>
+              <a:buChar char="•"/>
+            </a:pPr>
+            <a:r>
+              <a:rPr lang="en-US" b="1" dirty="0" smtClean="0">
                 <a:latin typeface="Helvetica Neue"/>
                 <a:cs typeface="Helvetica Neue"/>
               </a:rPr>
-              <a:t>Git</a:t>
-            </a:r>
-            <a:r>
-              <a:rPr lang="en-US" dirty="0">
+              <a:t>File Transfer Client</a:t>
+            </a:r>
+          </a:p>
+          <a:p>
+            <a:pPr marL="457200" indent="-457200">
+              <a:buFont typeface="Arial"/>
+              <a:buChar char="•"/>
+            </a:pPr>
+            <a:r>
+              <a:rPr lang="en-US" b="1" dirty="0" smtClean="0">
                 <a:latin typeface="Helvetica Neue"/>
                 <a:cs typeface="Helvetica Neue"/>
               </a:rPr>
-              <a:t> is the most popular option for version control.</a:t>
-            </a:r>
-            <a:endParaRPr lang="en-US" dirty="0">
+              <a:t>SSH Client</a:t>
+            </a:r>
+          </a:p>
+          <a:p>
+            <a:pPr marL="457200" indent="-457200">
+              <a:buFont typeface="Arial"/>
+              <a:buChar char="•"/>
+            </a:pPr>
+            <a:r>
+              <a:rPr lang="en-US" b="1" dirty="0" err="1" smtClean="0">
+                <a:latin typeface="Helvetica Neue"/>
+                <a:cs typeface="Helvetica Neue"/>
+              </a:rPr>
+              <a:t>Git</a:t>
+            </a:r>
+            <a:r>
+              <a:rPr lang="en-US" b="1" dirty="0" smtClean="0">
+                <a:latin typeface="Helvetica Neue"/>
+                <a:cs typeface="Helvetica Neue"/>
+              </a:rPr>
+              <a:t> Client</a:t>
+            </a:r>
+            <a:endParaRPr lang="en-US" dirty="0"/>
+          </a:p>
+        </p:txBody>
+      </p:sp>
+      <p:sp>
+        <p:nvSpPr>
+          <p:cNvPr id="9" name="Rectangle 8"/>
+          <p:cNvSpPr/>
+          <p:nvPr/>
+        </p:nvSpPr>
+        <p:spPr>
+          <a:xfrm>
+            <a:off x="269876" y="1921222"/>
+            <a:ext cx="8666831" cy="369332"/>
+          </a:xfrm>
+          <a:prstGeom prst="rect">
+            <a:avLst/>
+          </a:prstGeom>
+        </p:spPr>
+        <p:txBody>
+          <a:bodyPr wrap="square">
+            <a:spAutoFit/>
+          </a:bodyPr>
+          <a:lstStyle/>
+          <a:p>
+            <a:pPr algn="ctr"/>
+            <a:r>
+              <a:rPr lang="en-US" b="1" dirty="0" smtClean="0">
+                <a:latin typeface="Helvetica Neue"/>
+                <a:cs typeface="Helvetica Neue"/>
+              </a:rPr>
+              <a:t>Developer</a:t>
+            </a:r>
+            <a:endParaRPr lang="en-US" b="1" dirty="0">
               <a:latin typeface="Helvetica Neue"/>
               <a:cs typeface="Helvetica Neue"/>
             </a:endParaRPr>
@@ -10342,7 +10962,7 @@
     </p:spTree>
     <p:extLst>
       <p:ext uri="{BB962C8B-B14F-4D97-AF65-F5344CB8AC3E}">
-        <p14:creationId xmlns:p14="http://schemas.microsoft.com/office/powerpoint/2010/main" val="3031820590"/>
+        <p14:creationId xmlns:p14="http://schemas.microsoft.com/office/powerpoint/2010/main" val="2564505050"/>
       </p:ext>
     </p:extLst>
   </p:cSld>
@@ -10725,7 +11345,7 @@
         <p:spPr>
           <a:xfrm>
             <a:off x="1122632" y="4668528"/>
-            <a:ext cx="6894972" cy="1477328"/>
+            <a:ext cx="6894972" cy="923330"/>
           </a:xfrm>
           <a:prstGeom prst="rect">
             <a:avLst/>
@@ -10737,113 +11357,39 @@
           </a:bodyPr>
           <a:lstStyle/>
           <a:p>
-            <a:pPr marL="457200" indent="-457200">
-              <a:buFont typeface="Arial"/>
-              <a:buChar char="•"/>
+            <a:pPr>
+              <a:spcBef>
+                <a:spcPct val="0"/>
+              </a:spcBef>
             </a:pPr>
             <a:r>
-              <a:rPr lang="en-US" b="1" dirty="0" smtClean="0">
+              <a:rPr lang="en-US" dirty="0">
                 <a:latin typeface="Helvetica Neue"/>
                 <a:cs typeface="Helvetica Neue"/>
               </a:rPr>
-              <a:t>Create new local repository</a:t>
-            </a:r>
-          </a:p>
-          <a:p>
-            <a:pPr marL="457200" indent="-457200">
-              <a:buFont typeface="Arial"/>
-              <a:buChar char="•"/>
-            </a:pPr>
-            <a:r>
-              <a:rPr lang="en-US" b="1" dirty="0" smtClean="0">
+              <a:t>Version control is used to maintain code, document each commit and revert to previous versions when necessary. </a:t>
+            </a:r>
+            <a:r>
+              <a:rPr lang="en-US" dirty="0" err="1">
                 <a:latin typeface="Helvetica Neue"/>
                 <a:cs typeface="Helvetica Neue"/>
               </a:rPr>
-              <a:t>Checkout remote repository</a:t>
-            </a:r>
-          </a:p>
-          <a:p>
-            <a:pPr marL="457200" indent="-457200">
-              <a:buFont typeface="Arial"/>
-              <a:buChar char="•"/>
-            </a:pPr>
-            <a:r>
-              <a:rPr lang="en-US" b="1" dirty="0" smtClean="0">
+              <a:t>Git</a:t>
+            </a:r>
+            <a:r>
+              <a:rPr lang="en-US" dirty="0">
                 <a:latin typeface="Helvetica Neue"/>
                 <a:cs typeface="Helvetica Neue"/>
               </a:rPr>
-              <a:t>Update local repository</a:t>
-            </a:r>
-          </a:p>
-          <a:p>
-            <a:pPr marL="457200" indent="-457200">
-              <a:buFont typeface="Arial"/>
-              <a:buChar char="•"/>
-            </a:pPr>
-            <a:r>
-              <a:rPr lang="en-US" b="1" dirty="0" smtClean="0">
-                <a:latin typeface="Helvetica Neue"/>
-                <a:cs typeface="Helvetica Neue"/>
-              </a:rPr>
-              <a:t>Tags</a:t>
-            </a:r>
-          </a:p>
-          <a:p>
-            <a:pPr marL="457200" indent="-457200">
-              <a:buFont typeface="Arial"/>
-              <a:buChar char="•"/>
-            </a:pPr>
-            <a:r>
-              <a:rPr lang="en-US" b="1" dirty="0" smtClean="0">
-                <a:latin typeface="Helvetica Neue"/>
-                <a:cs typeface="Helvetica Neue"/>
-              </a:rPr>
-              <a:t>Logs</a:t>
-            </a:r>
-            <a:endParaRPr lang="en-US" dirty="0"/>
-          </a:p>
-        </p:txBody>
-      </p:sp>
-      <p:sp>
-        <p:nvSpPr>
-          <p:cNvPr id="9" name="Rectangle 8"/>
-          <p:cNvSpPr/>
-          <p:nvPr/>
-        </p:nvSpPr>
-        <p:spPr>
-          <a:xfrm>
-            <a:off x="269876" y="1921222"/>
-            <a:ext cx="8666831" cy="369332"/>
-          </a:xfrm>
-          <a:prstGeom prst="rect">
-            <a:avLst/>
-          </a:prstGeom>
-        </p:spPr>
-        <p:txBody>
-          <a:bodyPr wrap="square">
-            <a:spAutoFit/>
-          </a:bodyPr>
-          <a:lstStyle/>
-          <a:p>
-            <a:pPr algn="ctr"/>
-            <a:r>
-              <a:rPr lang="en-US" b="1" dirty="0" smtClean="0">
-                <a:latin typeface="Helvetica Neue"/>
-                <a:cs typeface="Helvetica Neue"/>
-              </a:rPr>
-              <a:t>Basic Functionality</a:t>
-            </a:r>
-            <a:endParaRPr lang="en-US" b="1" dirty="0">
-              <a:latin typeface="Helvetica Neue"/>
-              <a:cs typeface="Helvetica Neue"/>
-            </a:endParaRPr>
+              <a:t> is the most popular option for version control.</a:t>
+            </a:r>
           </a:p>
         </p:txBody>
       </p:sp>
     </p:spTree>
     <p:extLst>
       <p:ext uri="{BB962C8B-B14F-4D97-AF65-F5344CB8AC3E}">
-        <p14:creationId xmlns:p14="http://schemas.microsoft.com/office/powerpoint/2010/main" val="299974775"/>
+        <p14:creationId xmlns:p14="http://schemas.microsoft.com/office/powerpoint/2010/main" val="3031820590"/>
       </p:ext>
     </p:extLst>
   </p:cSld>
@@ -11225,8 +11771,8 @@
         </p:nvSpPr>
         <p:spPr>
           <a:xfrm>
-            <a:off x="1122632" y="4200605"/>
-            <a:ext cx="6894972" cy="2031325"/>
+            <a:off x="1122632" y="4668528"/>
+            <a:ext cx="6894972" cy="1477328"/>
           </a:xfrm>
           <a:prstGeom prst="rect">
             <a:avLst/>
@@ -11247,7 +11793,7 @@
                 <a:latin typeface="Helvetica Neue"/>
                 <a:cs typeface="Helvetica Neue"/>
               </a:rPr>
-              <a:t>Add</a:t>
+              <a:t>Create new local repository</a:t>
             </a:r>
           </a:p>
           <a:p>
@@ -11260,7 +11806,7 @@
                 <a:latin typeface="Helvetica Neue"/>
                 <a:cs typeface="Helvetica Neue"/>
               </a:rPr>
-              <a:t>Commit</a:t>
+              <a:t>Checkout remote repository</a:t>
             </a:r>
           </a:p>
           <a:p>
@@ -11273,7 +11819,7 @@
                 <a:latin typeface="Helvetica Neue"/>
                 <a:cs typeface="Helvetica Neue"/>
               </a:rPr>
-              <a:t>Push</a:t>
+              <a:t>Update local repository</a:t>
             </a:r>
           </a:p>
           <a:p>
@@ -11281,68 +11827,27 @@
               <a:buFont typeface="Arial"/>
               <a:buChar char="•"/>
             </a:pPr>
-            <a:endParaRPr lang="en-US" b="1" dirty="0">
-              <a:latin typeface="Helvetica Neue"/>
-              <a:cs typeface="Helvetica Neue"/>
-            </a:endParaRPr>
-          </a:p>
-          <a:p>
-            <a:r>
-              <a:rPr lang="en-US" i="1" dirty="0">
+            <a:r>
+              <a:rPr lang="en-US" b="1" dirty="0" smtClean="0">
                 <a:latin typeface="Helvetica Neue"/>
                 <a:cs typeface="Helvetica Neue"/>
               </a:rPr>
-              <a:t>Think of mailing a package. First, you add your items to the box (</a:t>
-            </a:r>
-            <a:r>
-              <a:rPr lang="en-US" b="1" i="1" dirty="0">
+              <a:t>Tags</a:t>
+            </a:r>
+          </a:p>
+          <a:p>
+            <a:pPr marL="457200" indent="-457200">
+              <a:buFont typeface="Arial"/>
+              <a:buChar char="•"/>
+            </a:pPr>
+            <a:r>
+              <a:rPr lang="en-US" b="1" dirty="0" smtClean="0">
                 <a:latin typeface="Helvetica Neue"/>
                 <a:cs typeface="Helvetica Neue"/>
               </a:rPr>
-              <a:t>add</a:t>
-            </a:r>
-            <a:r>
-              <a:rPr lang="en-US" i="1" dirty="0">
-                <a:latin typeface="Helvetica Neue"/>
-                <a:cs typeface="Helvetica Neue"/>
-              </a:rPr>
-              <a:t>). Then you are putting a label (</a:t>
-            </a:r>
-            <a:r>
-              <a:rPr lang="en-US" b="1" i="1" dirty="0">
-                <a:latin typeface="Helvetica Neue"/>
-                <a:cs typeface="Helvetica Neue"/>
-              </a:rPr>
-              <a:t>commit</a:t>
-            </a:r>
-            <a:r>
-              <a:rPr lang="en-US" i="1" dirty="0">
-                <a:latin typeface="Helvetica Neue"/>
-                <a:cs typeface="Helvetica Neue"/>
-              </a:rPr>
-              <a:t>). Finally you bring the package to a shipping company, like FedEx or UPS (</a:t>
-            </a:r>
-            <a:r>
-              <a:rPr lang="en-US" b="1" i="1" dirty="0">
-                <a:latin typeface="Helvetica Neue"/>
-                <a:cs typeface="Helvetica Neue"/>
-              </a:rPr>
-              <a:t>push</a:t>
-            </a:r>
-            <a:r>
-              <a:rPr lang="en-US" i="1" dirty="0">
-                <a:latin typeface="Helvetica Neue"/>
-                <a:cs typeface="Helvetica Neue"/>
-              </a:rPr>
-              <a:t>).</a:t>
-            </a:r>
-            <a:r>
-              <a:rPr lang="en-US" dirty="0">
-                <a:latin typeface="Helvetica Neue"/>
-                <a:cs typeface="Helvetica Neue"/>
-              </a:rPr>
-              <a:t> </a:t>
-            </a:r>
+              <a:t>Logs</a:t>
+            </a:r>
+            <a:endParaRPr lang="en-US" dirty="0"/>
           </a:p>
         </p:txBody>
       </p:sp>
@@ -11373,7 +11878,7 @@
                 <a:latin typeface="Helvetica Neue"/>
                 <a:cs typeface="Helvetica Neue"/>
               </a:rPr>
-              <a:t>Workflow</a:t>
+              <a:t>Basic Functionality</a:t>
             </a:r>
             <a:endParaRPr lang="en-US" b="1" dirty="0">
               <a:latin typeface="Helvetica Neue"/>
@@ -11385,7 +11890,7 @@
     </p:spTree>
     <p:extLst>
       <p:ext uri="{BB962C8B-B14F-4D97-AF65-F5344CB8AC3E}">
-        <p14:creationId xmlns:p14="http://schemas.microsoft.com/office/powerpoint/2010/main" val="3804207364"/>
+        <p14:creationId xmlns:p14="http://schemas.microsoft.com/office/powerpoint/2010/main" val="299974775"/>
       </p:ext>
     </p:extLst>
   </p:cSld>
@@ -11767,8 +12272,8 @@
         </p:nvSpPr>
         <p:spPr>
           <a:xfrm>
-            <a:off x="1122632" y="4667074"/>
-            <a:ext cx="6894972" cy="1200329"/>
+            <a:off x="1122632" y="4200605"/>
+            <a:ext cx="6894972" cy="2031325"/>
           </a:xfrm>
           <a:prstGeom prst="rect">
             <a:avLst/>
@@ -11789,12 +12294,8 @@
                 <a:latin typeface="Helvetica Neue"/>
                 <a:cs typeface="Helvetica Neue"/>
               </a:rPr>
-              <a:t>Checking out remote files</a:t>
-            </a:r>
-            <a:endParaRPr lang="en-US" dirty="0" smtClean="0">
-              <a:latin typeface="Helvetica Neue"/>
-              <a:cs typeface="Helvetica Neue"/>
-            </a:endParaRPr>
+              <a:t>Add</a:t>
+            </a:r>
           </a:p>
           <a:p>
             <a:pPr marL="457200" indent="-457200">
@@ -11806,7 +12307,7 @@
                 <a:latin typeface="Helvetica Neue"/>
                 <a:cs typeface="Helvetica Neue"/>
               </a:rPr>
-              <a:t>Resetting local repository</a:t>
+              <a:t>Commit</a:t>
             </a:r>
           </a:p>
           <a:p>
@@ -11815,18 +12316,11 @@
               <a:buChar char="•"/>
             </a:pPr>
             <a:r>
-              <a:rPr lang="en-US" b="1" dirty="0" err="1" smtClean="0">
-                <a:latin typeface="Helvetica Neue"/>
-                <a:cs typeface="Helvetica Neue"/>
-              </a:rPr>
-              <a:t>GitHub</a:t>
-            </a:r>
-            <a:r>
               <a:rPr lang="en-US" b="1" dirty="0" smtClean="0">
                 <a:latin typeface="Helvetica Neue"/>
                 <a:cs typeface="Helvetica Neue"/>
               </a:rPr>
-              <a:t> accounts, SSH keys</a:t>
+              <a:t>Push</a:t>
             </a:r>
           </a:p>
           <a:p>
@@ -11834,12 +12328,67 @@
               <a:buFont typeface="Arial"/>
               <a:buChar char="•"/>
             </a:pPr>
-            <a:r>
-              <a:rPr lang="en-US" b="1" dirty="0" smtClean="0">
+            <a:endParaRPr lang="en-US" b="1" dirty="0">
+              <a:latin typeface="Helvetica Neue"/>
+              <a:cs typeface="Helvetica Neue"/>
+            </a:endParaRPr>
+          </a:p>
+          <a:p>
+            <a:r>
+              <a:rPr lang="en-US" i="1" dirty="0">
                 <a:latin typeface="Helvetica Neue"/>
                 <a:cs typeface="Helvetica Neue"/>
               </a:rPr>
-              <a:t>Forking repositories</a:t>
+              <a:t>Think of mailing a package. First, you add your items to the box (</a:t>
+            </a:r>
+            <a:r>
+              <a:rPr lang="en-US" b="1" i="1" dirty="0">
+                <a:latin typeface="Helvetica Neue"/>
+                <a:cs typeface="Helvetica Neue"/>
+              </a:rPr>
+              <a:t>add</a:t>
+            </a:r>
+            <a:r>
+              <a:rPr lang="en-US" i="1" dirty="0">
+                <a:latin typeface="Helvetica Neue"/>
+                <a:cs typeface="Helvetica Neue"/>
+              </a:rPr>
+              <a:t>). Then you are putting a label (</a:t>
+            </a:r>
+            <a:r>
+              <a:rPr lang="en-US" b="1" i="1" dirty="0">
+                <a:latin typeface="Helvetica Neue"/>
+                <a:cs typeface="Helvetica Neue"/>
+              </a:rPr>
+              <a:t>commit</a:t>
+            </a:r>
+            <a:r>
+              <a:rPr lang="en-US" i="1" dirty="0">
+                <a:latin typeface="Helvetica Neue"/>
+                <a:cs typeface="Helvetica Neue"/>
+              </a:rPr>
+              <a:t>). Finally you bring the package to a shipping company, like FedEx or UPS (</a:t>
+            </a:r>
+            <a:r>
+              <a:rPr lang="en-US" b="1" i="1" dirty="0">
+                <a:latin typeface="Helvetica Neue"/>
+                <a:cs typeface="Helvetica Neue"/>
+              </a:rPr>
+              <a:t>push</a:t>
+            </a:r>
+            <a:r>
+              <a:rPr lang="en-US" i="1" dirty="0">
+                <a:latin typeface="Helvetica Neue"/>
+                <a:cs typeface="Helvetica Neue"/>
+              </a:rPr>
+              <a:t>).</a:t>
+            </a:r>
+            <a:r>
+              <a:rPr lang="en-US" dirty="0">
+                <a:latin typeface="Helvetica Neue"/>
+                <a:cs typeface="Helvetica Neue"/>
+              </a:rPr>
+              <a:t> </a:t>
             </a:r>
           </a:p>
         </p:txBody>
@@ -11871,7 +12420,7 @@
                 <a:latin typeface="Helvetica Neue"/>
                 <a:cs typeface="Helvetica Neue"/>
               </a:rPr>
-              <a:t>Other useful stuff</a:t>
+              <a:t>Workflow</a:t>
             </a:r>
             <a:endParaRPr lang="en-US" b="1" dirty="0">
               <a:latin typeface="Helvetica Neue"/>
@@ -11883,7 +12432,7 @@
     </p:spTree>
     <p:extLst>
       <p:ext uri="{BB962C8B-B14F-4D97-AF65-F5344CB8AC3E}">
-        <p14:creationId xmlns:p14="http://schemas.microsoft.com/office/powerpoint/2010/main" val="2004205596"/>
+        <p14:creationId xmlns:p14="http://schemas.microsoft.com/office/powerpoint/2010/main" val="3804207364"/>
       </p:ext>
     </p:extLst>
   </p:cSld>
@@ -12248,7 +12797,7 @@
                 <a:latin typeface="Helvetica Neue"/>
                 <a:cs typeface="Helvetica Neue"/>
               </a:rPr>
-              <a:t>Semester Project</a:t>
+              <a:t>Version Control</a:t>
             </a:r>
             <a:endParaRPr lang="en-US" sz="3000" b="1" dirty="0">
               <a:latin typeface="Helvetica Neue"/>
@@ -12287,8 +12836,12 @@
                 <a:latin typeface="Helvetica Neue"/>
                 <a:cs typeface="Helvetica Neue"/>
               </a:rPr>
-              <a:t>Social Network</a:t>
-            </a:r>
+              <a:t>Checking out remote files</a:t>
+            </a:r>
+            <a:endParaRPr lang="en-US" dirty="0" smtClean="0">
+              <a:latin typeface="Helvetica Neue"/>
+              <a:cs typeface="Helvetica Neue"/>
+            </a:endParaRPr>
           </a:p>
           <a:p>
             <a:pPr marL="457200" indent="-457200">
@@ -12300,7 +12853,7 @@
                 <a:latin typeface="Helvetica Neue"/>
                 <a:cs typeface="Helvetica Neue"/>
               </a:rPr>
-              <a:t>Blog</a:t>
+              <a:t>Resetting local repository</a:t>
             </a:r>
           </a:p>
           <a:p>
@@ -12309,11 +12862,18 @@
               <a:buChar char="•"/>
             </a:pPr>
             <a:r>
+              <a:rPr lang="en-US" b="1" dirty="0" err="1" smtClean="0">
+                <a:latin typeface="Helvetica Neue"/>
+                <a:cs typeface="Helvetica Neue"/>
+              </a:rPr>
+              <a:t>GitHub</a:t>
+            </a:r>
+            <a:r>
               <a:rPr lang="en-US" b="1" dirty="0" smtClean="0">
                 <a:latin typeface="Helvetica Neue"/>
                 <a:cs typeface="Helvetica Neue"/>
               </a:rPr>
-              <a:t>Store</a:t>
+              <a:t> accounts, SSH keys</a:t>
             </a:r>
           </a:p>
           <a:p>
@@ -12326,7 +12886,7 @@
                 <a:latin typeface="Helvetica Neue"/>
                 <a:cs typeface="Helvetica Neue"/>
               </a:rPr>
-              <a:t>Dashboard</a:t>
+              <a:t>Forking repositories</a:t>
             </a:r>
           </a:p>
         </p:txBody>
@@ -12358,7 +12918,7 @@
                 <a:latin typeface="Helvetica Neue"/>
                 <a:cs typeface="Helvetica Neue"/>
               </a:rPr>
-              <a:t>Ideas</a:t>
+              <a:t>Other useful stuff</a:t>
             </a:r>
             <a:endParaRPr lang="en-US" b="1" dirty="0">
               <a:latin typeface="Helvetica Neue"/>
@@ -12370,7 +12930,7 @@
     </p:spTree>
     <p:extLst>
       <p:ext uri="{BB962C8B-B14F-4D97-AF65-F5344CB8AC3E}">
-        <p14:creationId xmlns:p14="http://schemas.microsoft.com/office/powerpoint/2010/main" val="3831705916"/>
+        <p14:creationId xmlns:p14="http://schemas.microsoft.com/office/powerpoint/2010/main" val="2004205596"/>
       </p:ext>
     </p:extLst>
   </p:cSld>

</xml_diff>